<commit_message>
Update NeuroDOT Quick Start Guide.pptx
</commit_message>
<xml_diff>
--- a/NeuroDOT Quick Start Guide.pptx
+++ b/NeuroDOT Quick Start Guide.pptx
@@ -5,19 +5,20 @@
     <p:sldMasterId id="2147483694" r:id="rId1"/>
   </p:sldMasterIdLst>
   <p:notesMasterIdLst>
-    <p:notesMasterId r:id="rId12"/>
+    <p:notesMasterId r:id="rId13"/>
   </p:notesMasterIdLst>
   <p:sldIdLst>
     <p:sldId id="277" r:id="rId2"/>
     <p:sldId id="278" r:id="rId3"/>
     <p:sldId id="279" r:id="rId4"/>
     <p:sldId id="280" r:id="rId5"/>
-    <p:sldId id="286" r:id="rId6"/>
-    <p:sldId id="281" r:id="rId7"/>
-    <p:sldId id="283" r:id="rId8"/>
-    <p:sldId id="284" r:id="rId9"/>
-    <p:sldId id="285" r:id="rId10"/>
-    <p:sldId id="282" r:id="rId11"/>
+    <p:sldId id="287" r:id="rId6"/>
+    <p:sldId id="286" r:id="rId7"/>
+    <p:sldId id="281" r:id="rId8"/>
+    <p:sldId id="283" r:id="rId9"/>
+    <p:sldId id="284" r:id="rId10"/>
+    <p:sldId id="285" r:id="rId11"/>
+    <p:sldId id="282" r:id="rId12"/>
   </p:sldIdLst>
   <p:sldSz cx="12192000" cy="6858000"/>
   <p:notesSz cx="6858000" cy="9144000"/>
@@ -217,7 +218,7 @@
           <a:p>
             <a:fld id="{59435505-D4AB-4F36-857A-9B945E75E4E8}" type="datetimeFigureOut">
               <a:rPr lang="en-US" smtClean="0"/>
-              <a:t>4/23/2022</a:t>
+              <a:t>3/1/2024</a:t>
             </a:fld>
             <a:endParaRPr lang="en-US"/>
           </a:p>
@@ -482,6 +483,90 @@
     </a:lvl9pPr>
   </p:notesStyle>
 </p:notesMaster>
+</file>
+
+<file path=ppt/notesSlides/notesSlide1.xml><?xml version="1.0" encoding="utf-8"?>
+<p:notes xmlns:a="http://schemas.openxmlformats.org/drawingml/2006/main" xmlns:r="http://schemas.openxmlformats.org/officeDocument/2006/relationships" xmlns:p="http://schemas.openxmlformats.org/presentationml/2006/main">
+  <p:cSld>
+    <p:spTree>
+      <p:nvGrpSpPr>
+        <p:cNvPr id="1" name=""/>
+        <p:cNvGrpSpPr/>
+        <p:nvPr/>
+      </p:nvGrpSpPr>
+      <p:grpSpPr>
+        <a:xfrm>
+          <a:off x="0" y="0"/>
+          <a:ext cx="0" cy="0"/>
+          <a:chOff x="0" y="0"/>
+          <a:chExt cx="0" cy="0"/>
+        </a:xfrm>
+      </p:grpSpPr>
+      <p:sp>
+        <p:nvSpPr>
+          <p:cNvPr id="2" name="Slide Image Placeholder 1"/>
+          <p:cNvSpPr>
+            <a:spLocks noGrp="1" noRot="1" noChangeAspect="1"/>
+          </p:cNvSpPr>
+          <p:nvPr>
+            <p:ph type="sldImg"/>
+          </p:nvPr>
+        </p:nvSpPr>
+        <p:spPr/>
+      </p:sp>
+      <p:sp>
+        <p:nvSpPr>
+          <p:cNvPr id="3" name="Notes Placeholder 2"/>
+          <p:cNvSpPr>
+            <a:spLocks noGrp="1"/>
+          </p:cNvSpPr>
+          <p:nvPr>
+            <p:ph type="body" idx="1"/>
+          </p:nvPr>
+        </p:nvSpPr>
+        <p:spPr/>
+        <p:txBody>
+          <a:bodyPr/>
+          <a:lstStyle/>
+          <a:p>
+            <a:endParaRPr lang="en-US" dirty="0"/>
+          </a:p>
+        </p:txBody>
+      </p:sp>
+      <p:sp>
+        <p:nvSpPr>
+          <p:cNvPr id="4" name="Slide Number Placeholder 3"/>
+          <p:cNvSpPr>
+            <a:spLocks noGrp="1"/>
+          </p:cNvSpPr>
+          <p:nvPr>
+            <p:ph type="sldNum" sz="quarter" idx="5"/>
+          </p:nvPr>
+        </p:nvSpPr>
+        <p:spPr/>
+        <p:txBody>
+          <a:bodyPr/>
+          <a:lstStyle/>
+          <a:p>
+            <a:fld id="{3D468E2D-EFB9-4AD3-BCB1-EC1F9CDD038B}" type="slidenum">
+              <a:rPr lang="en-US" smtClean="0"/>
+              <a:t>5</a:t>
+            </a:fld>
+            <a:endParaRPr lang="en-US"/>
+          </a:p>
+        </p:txBody>
+      </p:sp>
+    </p:spTree>
+    <p:extLst>
+      <p:ext uri="{BB962C8B-B14F-4D97-AF65-F5344CB8AC3E}">
+        <p14:creationId xmlns:p14="http://schemas.microsoft.com/office/powerpoint/2010/main" val="1457770100"/>
+      </p:ext>
+    </p:extLst>
+  </p:cSld>
+  <p:clrMapOvr>
+    <a:masterClrMapping/>
+  </p:clrMapOvr>
+</p:notes>
 </file>
 
 <file path=ppt/slideLayouts/slideLayout1.xml><?xml version="1.0" encoding="utf-8"?>
@@ -1208,7 +1293,7 @@
           <a:p>
             <a:fld id="{9A27A8A0-7E57-4448-B01C-EFDBF93D0A36}" type="datetimeFigureOut">
               <a:rPr lang="en-US" smtClean="0"/>
-              <a:t>4/23/2022</a:t>
+              <a:t>3/1/2024</a:t>
             </a:fld>
             <a:endParaRPr lang="en-US"/>
           </a:p>
@@ -1459,7 +1544,7 @@
           <a:p>
             <a:fld id="{9A27A8A0-7E57-4448-B01C-EFDBF93D0A36}" type="datetimeFigureOut">
               <a:rPr lang="en-US" smtClean="0"/>
-              <a:t>4/23/2022</a:t>
+              <a:t>3/1/2024</a:t>
             </a:fld>
             <a:endParaRPr lang="en-US"/>
           </a:p>
@@ -1773,7 +1858,7 @@
           <a:p>
             <a:fld id="{9A27A8A0-7E57-4448-B01C-EFDBF93D0A36}" type="datetimeFigureOut">
               <a:rPr lang="en-US" smtClean="0"/>
-              <a:t>4/23/2022</a:t>
+              <a:t>3/1/2024</a:t>
             </a:fld>
             <a:endParaRPr lang="en-US"/>
           </a:p>
@@ -2100,7 +2185,7 @@
           <a:p>
             <a:fld id="{9A27A8A0-7E57-4448-B01C-EFDBF93D0A36}" type="datetimeFigureOut">
               <a:rPr lang="en-US" smtClean="0"/>
-              <a:t>4/23/2022</a:t>
+              <a:t>3/1/2024</a:t>
             </a:fld>
             <a:endParaRPr lang="en-US"/>
           </a:p>
@@ -2414,7 +2499,7 @@
           <a:p>
             <a:fld id="{9A27A8A0-7E57-4448-B01C-EFDBF93D0A36}" type="datetimeFigureOut">
               <a:rPr lang="en-US" smtClean="0"/>
-              <a:t>4/23/2022</a:t>
+              <a:t>3/1/2024</a:t>
             </a:fld>
             <a:endParaRPr lang="en-US"/>
           </a:p>
@@ -2801,7 +2886,7 @@
           <a:p>
             <a:fld id="{9A27A8A0-7E57-4448-B01C-EFDBF93D0A36}" type="datetimeFigureOut">
               <a:rPr lang="en-US" smtClean="0"/>
-              <a:t>4/23/2022</a:t>
+              <a:t>3/1/2024</a:t>
             </a:fld>
             <a:endParaRPr lang="en-US"/>
           </a:p>
@@ -2971,7 +3056,7 @@
           <a:p>
             <a:fld id="{9A27A8A0-7E57-4448-B01C-EFDBF93D0A36}" type="datetimeFigureOut">
               <a:rPr lang="en-US" smtClean="0"/>
-              <a:t>4/23/2022</a:t>
+              <a:t>3/1/2024</a:t>
             </a:fld>
             <a:endParaRPr lang="en-US"/>
           </a:p>
@@ -3151,7 +3236,7 @@
           <a:p>
             <a:fld id="{9A27A8A0-7E57-4448-B01C-EFDBF93D0A36}" type="datetimeFigureOut">
               <a:rPr lang="en-US" smtClean="0"/>
-              <a:t>4/23/2022</a:t>
+              <a:t>3/1/2024</a:t>
             </a:fld>
             <a:endParaRPr lang="en-US"/>
           </a:p>
@@ -3327,7 +3412,7 @@
           <a:p>
             <a:fld id="{9A27A8A0-7E57-4448-B01C-EFDBF93D0A36}" type="datetimeFigureOut">
               <a:rPr lang="en-US" smtClean="0"/>
-              <a:t>4/23/2022</a:t>
+              <a:t>3/1/2024</a:t>
             </a:fld>
             <a:endParaRPr lang="en-US"/>
           </a:p>
@@ -3574,7 +3659,7 @@
           <a:p>
             <a:fld id="{9A27A8A0-7E57-4448-B01C-EFDBF93D0A36}" type="datetimeFigureOut">
               <a:rPr lang="en-US" smtClean="0"/>
-              <a:t>4/23/2022</a:t>
+              <a:t>3/1/2024</a:t>
             </a:fld>
             <a:endParaRPr lang="en-US"/>
           </a:p>
@@ -3806,7 +3891,7 @@
           <a:p>
             <a:fld id="{9A27A8A0-7E57-4448-B01C-EFDBF93D0A36}" type="datetimeFigureOut">
               <a:rPr lang="en-US" smtClean="0"/>
-              <a:t>4/23/2022</a:t>
+              <a:t>3/1/2024</a:t>
             </a:fld>
             <a:endParaRPr lang="en-US"/>
           </a:p>
@@ -4180,7 +4265,7 @@
           <a:p>
             <a:fld id="{9A27A8A0-7E57-4448-B01C-EFDBF93D0A36}" type="datetimeFigureOut">
               <a:rPr lang="en-US" smtClean="0"/>
-              <a:t>4/23/2022</a:t>
+              <a:t>3/1/2024</a:t>
             </a:fld>
             <a:endParaRPr lang="en-US"/>
           </a:p>
@@ -4303,7 +4388,7 @@
           <a:p>
             <a:fld id="{9A27A8A0-7E57-4448-B01C-EFDBF93D0A36}" type="datetimeFigureOut">
               <a:rPr lang="en-US" smtClean="0"/>
-              <a:t>4/23/2022</a:t>
+              <a:t>3/1/2024</a:t>
             </a:fld>
             <a:endParaRPr lang="en-US"/>
           </a:p>
@@ -4398,7 +4483,7 @@
           <a:p>
             <a:fld id="{9A27A8A0-7E57-4448-B01C-EFDBF93D0A36}" type="datetimeFigureOut">
               <a:rPr lang="en-US" smtClean="0"/>
-              <a:t>4/23/2022</a:t>
+              <a:t>3/1/2024</a:t>
             </a:fld>
             <a:endParaRPr lang="en-US"/>
           </a:p>
@@ -4653,7 +4738,7 @@
           <a:p>
             <a:fld id="{9A27A8A0-7E57-4448-B01C-EFDBF93D0A36}" type="datetimeFigureOut">
               <a:rPr lang="en-US" smtClean="0"/>
-              <a:t>4/23/2022</a:t>
+              <a:t>3/1/2024</a:t>
             </a:fld>
             <a:endParaRPr lang="en-US"/>
           </a:p>
@@ -4916,7 +5001,7 @@
           <a:p>
             <a:fld id="{9A27A8A0-7E57-4448-B01C-EFDBF93D0A36}" type="datetimeFigureOut">
               <a:rPr lang="en-US" smtClean="0"/>
-              <a:t>4/23/2022</a:t>
+              <a:t>3/1/2024</a:t>
             </a:fld>
             <a:endParaRPr lang="en-US"/>
           </a:p>
@@ -5664,7 +5749,7 @@
           <a:p>
             <a:fld id="{9A27A8A0-7E57-4448-B01C-EFDBF93D0A36}" type="datetimeFigureOut">
               <a:rPr lang="en-US" smtClean="0"/>
-              <a:t>4/23/2022</a:t>
+              <a:t>3/1/2024</a:t>
             </a:fld>
             <a:endParaRPr lang="en-US"/>
           </a:p>
@@ -6316,6 +6401,224 @@
           <a:p>
             <a:r>
               <a:rPr lang="en-US"/>
+              <a:t>Help Files</a:t>
+            </a:r>
+          </a:p>
+        </p:txBody>
+      </p:sp>
+      <p:sp>
+        <p:nvSpPr>
+          <p:cNvPr id="3" name="Content Placeholder 2"/>
+          <p:cNvSpPr>
+            <a:spLocks noGrp="1"/>
+          </p:cNvSpPr>
+          <p:nvPr>
+            <p:ph idx="1"/>
+          </p:nvPr>
+        </p:nvSpPr>
+        <p:spPr>
+          <a:xfrm>
+            <a:off x="910798" y="1320800"/>
+            <a:ext cx="8596668" cy="5070272"/>
+          </a:xfrm>
+        </p:spPr>
+        <p:txBody>
+          <a:bodyPr numCol="1">
+            <a:noAutofit/>
+          </a:bodyPr>
+          <a:lstStyle/>
+          <a:p>
+            <a:r>
+              <a:rPr lang="en-US" sz="2000" dirty="0">
+                <a:solidFill>
+                  <a:schemeClr val="tx1"/>
+                </a:solidFill>
+              </a:rPr>
+              <a:t>Help Files - These provide function-specific information similar to and viewable through MATLAB's own help documentation.</a:t>
+            </a:r>
+          </a:p>
+          <a:p>
+            <a:pPr lvl="1"/>
+            <a:r>
+              <a:rPr lang="en-US" sz="1800" dirty="0">
+                <a:solidFill>
+                  <a:schemeClr val="tx1"/>
+                </a:solidFill>
+              </a:rPr>
+              <a:t>Function Help Sections</a:t>
+            </a:r>
+          </a:p>
+          <a:p>
+            <a:pPr lvl="2"/>
+            <a:r>
+              <a:rPr lang="en-US" sz="1600" dirty="0">
+                <a:solidFill>
+                  <a:schemeClr val="tx1"/>
+                </a:solidFill>
+              </a:rPr>
+              <a:t>These are contained in each function, and can be called from the command line with </a:t>
+            </a:r>
+            <a:r>
+              <a:rPr lang="en-US" sz="1600" dirty="0">
+                <a:solidFill>
+                  <a:srgbClr val="00B0F0"/>
+                </a:solidFill>
+              </a:rPr>
+              <a:t>help </a:t>
+            </a:r>
+            <a:r>
+              <a:rPr lang="en-US" sz="1600" i="1" dirty="0" err="1">
+                <a:solidFill>
+                  <a:srgbClr val="00B0F0"/>
+                </a:solidFill>
+              </a:rPr>
+              <a:t>function_name</a:t>
+            </a:r>
+            <a:r>
+              <a:rPr lang="en-US" sz="1600" dirty="0">
+                <a:solidFill>
+                  <a:schemeClr val="tx1"/>
+                </a:solidFill>
+              </a:rPr>
+              <a:t>.</a:t>
+            </a:r>
+          </a:p>
+          <a:p>
+            <a:pPr lvl="1"/>
+            <a:r>
+              <a:rPr lang="en-US" sz="1800" dirty="0">
+                <a:solidFill>
+                  <a:schemeClr val="tx1"/>
+                </a:solidFill>
+              </a:rPr>
+              <a:t>Toolbox Help (through MATLAB Help Viewer)</a:t>
+            </a:r>
+          </a:p>
+          <a:p>
+            <a:pPr lvl="2"/>
+            <a:r>
+              <a:rPr lang="en-US" sz="1600" dirty="0">
+                <a:solidFill>
+                  <a:schemeClr val="tx1"/>
+                </a:solidFill>
+              </a:rPr>
+              <a:t>This is a plug-in to the MATLAB Help Viewer that becomes accessible as soon as the </a:t>
+            </a:r>
+            <a:r>
+              <a:rPr lang="en-US" sz="1600" dirty="0" err="1">
+                <a:solidFill>
+                  <a:schemeClr val="tx1"/>
+                </a:solidFill>
+              </a:rPr>
+              <a:t>NeuroDOT</a:t>
+            </a:r>
+            <a:r>
+              <a:rPr lang="en-US" sz="1600" dirty="0">
+                <a:solidFill>
+                  <a:schemeClr val="tx1"/>
+                </a:solidFill>
+              </a:rPr>
+              <a:t> 2 directory is added to the MATLAB search path.</a:t>
+            </a:r>
+          </a:p>
+          <a:p>
+            <a:pPr lvl="1"/>
+            <a:r>
+              <a:rPr lang="en-US" sz="1800" dirty="0">
+                <a:solidFill>
+                  <a:schemeClr val="tx1"/>
+                </a:solidFill>
+              </a:rPr>
+              <a:t>User Manual Index</a:t>
+            </a:r>
+          </a:p>
+          <a:p>
+            <a:pPr lvl="2"/>
+            <a:r>
+              <a:rPr lang="en-US" sz="1600" dirty="0">
+                <a:solidFill>
+                  <a:schemeClr val="tx1"/>
+                </a:solidFill>
+              </a:rPr>
+              <a:t>A hyperlinked index of all components of the toolbox.</a:t>
+            </a:r>
+          </a:p>
+          <a:p>
+            <a:pPr lvl="1"/>
+            <a:r>
+              <a:rPr lang="en-US" sz="1800" dirty="0">
+                <a:solidFill>
+                  <a:schemeClr val="tx1"/>
+                </a:solidFill>
+              </a:rPr>
+              <a:t>Pipeline Scripts</a:t>
+            </a:r>
+          </a:p>
+          <a:p>
+            <a:pPr lvl="2"/>
+            <a:r>
+              <a:rPr lang="en-US" sz="1600" dirty="0">
+                <a:solidFill>
+                  <a:schemeClr val="tx1"/>
+                </a:solidFill>
+              </a:rPr>
+              <a:t>Pre-assembled scripts for each pipeline.</a:t>
+            </a:r>
+          </a:p>
+        </p:txBody>
+      </p:sp>
+    </p:spTree>
+    <p:extLst>
+      <p:ext uri="{BB962C8B-B14F-4D97-AF65-F5344CB8AC3E}">
+        <p14:creationId xmlns:p14="http://schemas.microsoft.com/office/powerpoint/2010/main" val="2279508605"/>
+      </p:ext>
+    </p:extLst>
+  </p:cSld>
+  <p:clrMapOvr>
+    <a:masterClrMapping/>
+  </p:clrMapOvr>
+</p:sld>
+</file>
+
+<file path=ppt/slides/slide11.xml><?xml version="1.0" encoding="utf-8"?>
+<p:sld xmlns:a="http://schemas.openxmlformats.org/drawingml/2006/main" xmlns:r="http://schemas.openxmlformats.org/officeDocument/2006/relationships" xmlns:p="http://schemas.openxmlformats.org/presentationml/2006/main" showMasterSp="0">
+  <p:cSld>
+    <p:spTree>
+      <p:nvGrpSpPr>
+        <p:cNvPr id="1" name=""/>
+        <p:cNvGrpSpPr/>
+        <p:nvPr/>
+      </p:nvGrpSpPr>
+      <p:grpSpPr>
+        <a:xfrm>
+          <a:off x="0" y="0"/>
+          <a:ext cx="0" cy="0"/>
+          <a:chOff x="0" y="0"/>
+          <a:chExt cx="0" cy="0"/>
+        </a:xfrm>
+      </p:grpSpPr>
+      <p:sp>
+        <p:nvSpPr>
+          <p:cNvPr id="2" name="Title 1"/>
+          <p:cNvSpPr>
+            <a:spLocks noGrp="1"/>
+          </p:cNvSpPr>
+          <p:nvPr>
+            <p:ph type="title"/>
+          </p:nvPr>
+        </p:nvSpPr>
+        <p:spPr>
+          <a:xfrm>
+            <a:off x="0" y="0"/>
+            <a:ext cx="8596668" cy="1320800"/>
+          </a:xfrm>
+        </p:spPr>
+        <p:txBody>
+          <a:bodyPr/>
+          <a:lstStyle/>
+          <a:p>
+            <a:r>
+              <a:rPr lang="en-US"/>
               <a:t>That’s It (For Now)</a:t>
             </a:r>
             <a:endParaRPr lang="en-US" dirty="0"/>
@@ -6341,8 +6644,11 @@
           <a:p>
             <a:r>
               <a:rPr lang="en-US" sz="2000" dirty="0"/>
-              <a:t>For further questions or more information, please consult the NeuroDOT User Manual and the complete list of documentation made available in this guide.</a:t>
-            </a:r>
+              <a:t>For further questions or more information, please consult the NeuroDOT Documentation.</a:t>
+            </a:r>
+          </a:p>
+          <a:p>
+            <a:endParaRPr lang="en-US" sz="2000" dirty="0"/>
           </a:p>
           <a:p>
             <a:endParaRPr lang="en-US" sz="2000" dirty="0"/>
@@ -6374,53 +6680,36 @@
             <a:pPr lvl="1"/>
             <a:r>
               <a:rPr lang="en-US" dirty="0"/>
-              <a:t>Jason Trobaugh (</a:t>
+              <a:t>Emma Speh (</a:t>
             </a:r>
             <a:r>
               <a:rPr lang="en-US" dirty="0">
                 <a:hlinkClick r:id="rId3"/>
               </a:rPr>
-              <a:t>jasont@wustl.edu</a:t>
+              <a:t>espeh@wustl.edu</a:t>
             </a:r>
             <a:r>
               <a:rPr lang="en-US" dirty="0"/>
-              <a:t>) </a:t>
+              <a:t>)</a:t>
             </a:r>
           </a:p>
           <a:p>
             <a:pPr lvl="1"/>
             <a:r>
               <a:rPr lang="en-US" dirty="0"/>
-              <a:t>Emma Speh (</a:t>
+              <a:t>Ari </a:t>
+            </a:r>
+            <a:r>
+              <a:rPr lang="en-US" dirty="0" err="1"/>
+              <a:t>Segel</a:t>
+            </a:r>
+            <a:r>
+              <a:rPr lang="en-US" dirty="0"/>
+              <a:t> (</a:t>
             </a:r>
             <a:r>
               <a:rPr lang="en-US" dirty="0">
                 <a:hlinkClick r:id="rId4"/>
-              </a:rPr>
-              <a:t>espeh@wustl.edu</a:t>
-            </a:r>
-            <a:r>
-              <a:rPr lang="en-US" dirty="0"/>
-              <a:t>)</a:t>
-            </a:r>
-          </a:p>
-          <a:p>
-            <a:pPr lvl="1"/>
-            <a:r>
-              <a:rPr lang="en-US" dirty="0"/>
-              <a:t>Ari </a:t>
-            </a:r>
-            <a:r>
-              <a:rPr lang="en-US" dirty="0" err="1"/>
-              <a:t>Segel</a:t>
-            </a:r>
-            <a:r>
-              <a:rPr lang="en-US" dirty="0"/>
-              <a:t> (</a:t>
-            </a:r>
-            <a:r>
-              <a:rPr lang="en-US" dirty="0">
-                <a:hlinkClick r:id="rId5"/>
               </a:rPr>
               <a:t>ari@wustl.edu</a:t>
             </a:r>
@@ -6516,12 +6805,8 @@
           </a:p>
           <a:p>
             <a:r>
-              <a:rPr lang="en-US" dirty="0" err="1"/>
-              <a:t>NeuroDOT</a:t>
-            </a:r>
-            <a:r>
               <a:rPr lang="en-US" dirty="0"/>
-              <a:t> is optimized for use in MATLAB 2015b on Windows and Unix. If you do not have MATLAB, contact your IT department or go to </a:t>
+              <a:t>NeuroDOT is optimized for use in MATLAB 2020b on Windows and Unix. If you do not have MATLAB, contact your IT department or go to </a:t>
             </a:r>
             <a:r>
               <a:rPr lang="en-US" dirty="0">
@@ -6746,7 +7031,7 @@
         </p:nvSpPr>
         <p:spPr>
           <a:xfrm>
-            <a:off x="677334" y="2160589"/>
+            <a:off x="618968" y="1488613"/>
             <a:ext cx="10625666" cy="3880773"/>
           </a:xfrm>
         </p:spPr>
@@ -6755,11 +7040,11 @@
           <a:lstStyle/>
           <a:p>
             <a:r>
-              <a:rPr lang="en-US"/>
+              <a:rPr lang="en-US" dirty="0"/>
               <a:t>Alternatively, you can go to the MATLAB console, "</a:t>
             </a:r>
             <a:r>
-              <a:rPr lang="en-US">
+              <a:rPr lang="en-US" dirty="0">
                 <a:solidFill>
                   <a:srgbClr val="00B050"/>
                 </a:solidFill>
@@ -6767,11 +7052,11 @@
               <a:t>Home</a:t>
             </a:r>
             <a:r>
-              <a:rPr lang="en-US"/>
+              <a:rPr lang="en-US" dirty="0"/>
               <a:t>" tab, under "</a:t>
             </a:r>
             <a:r>
-              <a:rPr lang="en-US">
+              <a:rPr lang="en-US" dirty="0">
                 <a:solidFill>
                   <a:srgbClr val="00B050"/>
                 </a:solidFill>
@@ -6779,11 +7064,11 @@
               <a:t>Environment</a:t>
             </a:r>
             <a:r>
-              <a:rPr lang="en-US"/>
+              <a:rPr lang="en-US" dirty="0"/>
               <a:t>", and click on the "</a:t>
             </a:r>
             <a:r>
-              <a:rPr lang="en-US">
+              <a:rPr lang="en-US" dirty="0">
                 <a:solidFill>
                   <a:srgbClr val="00B050"/>
                 </a:solidFill>
@@ -6791,11 +7076,11 @@
               <a:t>Set Path</a:t>
             </a:r>
             <a:r>
-              <a:rPr lang="en-US"/>
+              <a:rPr lang="en-US" dirty="0"/>
               <a:t>" button. Then, click on the "</a:t>
             </a:r>
             <a:r>
-              <a:rPr lang="en-US">
+              <a:rPr lang="en-US" dirty="0">
                 <a:solidFill>
                   <a:srgbClr val="00B050"/>
                 </a:solidFill>
@@ -6803,11 +7088,11 @@
               <a:t>Add with Subfolders…</a:t>
             </a:r>
             <a:r>
-              <a:rPr lang="en-US"/>
+              <a:rPr lang="en-US" dirty="0"/>
               <a:t>" button and use the file window to navigate to </a:t>
             </a:r>
             <a:r>
-              <a:rPr lang="en-US">
+              <a:rPr lang="en-US" dirty="0">
                 <a:solidFill>
                   <a:srgbClr val="FFC000"/>
                 </a:solidFill>
@@ -6815,95 +7100,86 @@
               <a:t>the directory you extracted the toolbox to</a:t>
             </a:r>
             <a:r>
-              <a:rPr lang="en-US"/>
+              <a:rPr lang="en-US" dirty="0"/>
               <a:t>.</a:t>
             </a:r>
           </a:p>
         </p:txBody>
       </p:sp>
-      <p:grpSp>
-        <p:nvGrpSpPr>
-          <p:cNvPr id="6" name="Group 5"/>
-          <p:cNvGrpSpPr/>
+      <p:pic>
+        <p:nvPicPr>
+          <p:cNvPr id="8" name="Picture 7">
+            <a:extLst>
+              <a:ext uri="{FF2B5EF4-FFF2-40B4-BE49-F238E27FC236}">
+                <a16:creationId xmlns:a16="http://schemas.microsoft.com/office/drawing/2014/main" id="{20C4E898-8E5F-C38B-9C21-74E57B0A4B19}"/>
+              </a:ext>
+            </a:extLst>
+          </p:cNvPr>
+          <p:cNvPicPr>
+            <a:picLocks noChangeAspect="1"/>
+          </p:cNvPicPr>
           <p:nvPr/>
-        </p:nvGrpSpPr>
-        <p:grpSpPr>
+        </p:nvPicPr>
+        <p:blipFill>
+          <a:blip r:embed="rId2"/>
+          <a:stretch>
+            <a:fillRect/>
+          </a:stretch>
+        </p:blipFill>
+        <p:spPr>
           <a:xfrm>
-            <a:off x="3013869" y="3248465"/>
-            <a:ext cx="6164262" cy="3301560"/>
-            <a:chOff x="4330700" y="3286565"/>
-            <a:chExt cx="6164262" cy="3301560"/>
+            <a:off x="3371470" y="2757536"/>
+            <a:ext cx="5449060" cy="3810532"/>
           </a:xfrm>
-        </p:grpSpPr>
-        <p:pic>
-          <p:nvPicPr>
-            <p:cNvPr id="4" name="Picture 3"/>
-            <p:cNvPicPr>
-              <a:picLocks noChangeAspect="1"/>
-            </p:cNvPicPr>
-            <p:nvPr/>
-          </p:nvPicPr>
-          <p:blipFill>
-            <a:blip r:embed="rId2"/>
-            <a:stretch>
-              <a:fillRect/>
-            </a:stretch>
-          </p:blipFill>
-          <p:spPr>
-            <a:xfrm>
-              <a:off x="4330700" y="3286565"/>
-              <a:ext cx="6164262" cy="3301560"/>
-            </a:xfrm>
-            <a:prstGeom prst="rect">
-              <a:avLst/>
-            </a:prstGeom>
-          </p:spPr>
-        </p:pic>
-        <p:sp>
-          <p:nvSpPr>
-            <p:cNvPr id="5" name="Rounded Rectangle 4"/>
-            <p:cNvSpPr/>
-            <p:nvPr/>
-          </p:nvSpPr>
-          <p:spPr>
-            <a:xfrm>
-              <a:off x="4432300" y="4013200"/>
-              <a:ext cx="1231900" cy="241300"/>
-            </a:xfrm>
-            <a:prstGeom prst="roundRect">
-              <a:avLst/>
-            </a:prstGeom>
-            <a:noFill/>
-            <a:ln w="76200">
-              <a:solidFill>
-                <a:srgbClr val="FF0000"/>
-              </a:solidFill>
-            </a:ln>
-          </p:spPr>
-          <p:style>
-            <a:lnRef idx="2">
-              <a:schemeClr val="accent5"/>
-            </a:lnRef>
-            <a:fillRef idx="1">
-              <a:schemeClr val="lt1"/>
-            </a:fillRef>
-            <a:effectRef idx="0">
-              <a:schemeClr val="accent5"/>
-            </a:effectRef>
-            <a:fontRef idx="minor">
-              <a:schemeClr val="dk1"/>
-            </a:fontRef>
-          </p:style>
-          <p:txBody>
-            <a:bodyPr rtlCol="0" anchor="ctr"/>
-            <a:lstStyle/>
-            <a:p>
-              <a:pPr algn="ctr"/>
-              <a:endParaRPr lang="en-US"/>
-            </a:p>
-          </p:txBody>
-        </p:sp>
-      </p:grpSp>
+          <a:prstGeom prst="rect">
+            <a:avLst/>
+          </a:prstGeom>
+        </p:spPr>
+      </p:pic>
+      <p:sp>
+        <p:nvSpPr>
+          <p:cNvPr id="5" name="Rounded Rectangle 4"/>
+          <p:cNvSpPr/>
+          <p:nvPr/>
+        </p:nvSpPr>
+        <p:spPr>
+          <a:xfrm>
+            <a:off x="3453589" y="3511112"/>
+            <a:ext cx="1419968" cy="241300"/>
+          </a:xfrm>
+          <a:prstGeom prst="roundRect">
+            <a:avLst/>
+          </a:prstGeom>
+          <a:noFill/>
+          <a:ln w="76200">
+            <a:solidFill>
+              <a:srgbClr val="FF0000"/>
+            </a:solidFill>
+          </a:ln>
+        </p:spPr>
+        <p:style>
+          <a:lnRef idx="2">
+            <a:schemeClr val="accent5"/>
+          </a:lnRef>
+          <a:fillRef idx="1">
+            <a:schemeClr val="lt1"/>
+          </a:fillRef>
+          <a:effectRef idx="0">
+            <a:schemeClr val="accent5"/>
+          </a:effectRef>
+          <a:fontRef idx="minor">
+            <a:schemeClr val="dk1"/>
+          </a:fontRef>
+        </p:style>
+        <p:txBody>
+          <a:bodyPr rtlCol="0" anchor="ctr"/>
+          <a:lstStyle/>
+          <a:p>
+            <a:pPr algn="ctr"/>
+            <a:endParaRPr lang="en-US"/>
+          </a:p>
+        </p:txBody>
+      </p:sp>
     </p:spTree>
     <p:extLst>
       <p:ext uri="{BB962C8B-B14F-4D97-AF65-F5344CB8AC3E}">
@@ -6918,7 +7194,7 @@
 </file>
 
 <file path=ppt/slides/slide5.xml><?xml version="1.0" encoding="utf-8"?>
-<p:sld xmlns:a="http://schemas.openxmlformats.org/drawingml/2006/main" xmlns:r="http://schemas.openxmlformats.org/officeDocument/2006/relationships" xmlns:p="http://schemas.openxmlformats.org/presentationml/2006/main" showMasterSp="0">
+<p:sld xmlns:a="http://schemas.openxmlformats.org/drawingml/2006/main" xmlns:r="http://schemas.openxmlformats.org/officeDocument/2006/relationships" xmlns:p="http://schemas.openxmlformats.org/presentationml/2006/main">
   <p:cSld>
     <p:spTree>
       <p:nvGrpSpPr>
@@ -6936,143 +7212,247 @@
       </p:grpSpPr>
       <p:sp>
         <p:nvSpPr>
-          <p:cNvPr id="2" name="Title 1"/>
+          <p:cNvPr id="2" name="Title 1">
+            <a:extLst>
+              <a:ext uri="{FF2B5EF4-FFF2-40B4-BE49-F238E27FC236}">
+                <a16:creationId xmlns:a16="http://schemas.microsoft.com/office/drawing/2014/main" id="{D01BA179-CF44-26A3-268F-D843267250E1}"/>
+              </a:ext>
+            </a:extLst>
+          </p:cNvPr>
           <p:cNvSpPr>
             <a:spLocks noGrp="1"/>
           </p:cNvSpPr>
           <p:nvPr>
             <p:ph type="title"/>
+          </p:nvPr>
+        </p:nvSpPr>
+        <p:spPr/>
+        <p:txBody>
+          <a:bodyPr/>
+          <a:lstStyle/>
+          <a:p>
+            <a:r>
+              <a:rPr lang="en-US" dirty="0"/>
+              <a:t>Dependencies for greater functionality</a:t>
+            </a:r>
+          </a:p>
+        </p:txBody>
+      </p:sp>
+      <p:sp>
+        <p:nvSpPr>
+          <p:cNvPr id="3" name="Content Placeholder 2">
+            <a:extLst>
+              <a:ext uri="{FF2B5EF4-FFF2-40B4-BE49-F238E27FC236}">
+                <a16:creationId xmlns:a16="http://schemas.microsoft.com/office/drawing/2014/main" id="{5BCE974E-846F-9696-CED0-66EDB86017D1}"/>
+              </a:ext>
+            </a:extLst>
+          </p:cNvPr>
+          <p:cNvSpPr>
+            <a:spLocks noGrp="1"/>
+          </p:cNvSpPr>
+          <p:nvPr>
+            <p:ph idx="1"/>
           </p:nvPr>
         </p:nvSpPr>
         <p:spPr>
           <a:xfrm>
-            <a:off x="0" y="0"/>
-            <a:ext cx="8596668" cy="1320800"/>
+            <a:off x="677334" y="1742300"/>
+            <a:ext cx="10918036" cy="4600134"/>
           </a:xfrm>
         </p:spPr>
         <p:txBody>
-          <a:bodyPr/>
-          <a:lstStyle/>
-          <a:p>
-            <a:r>
-              <a:rPr lang="en-US"/>
-              <a:t>Overview of Documentation</a:t>
-            </a:r>
-          </a:p>
-        </p:txBody>
-      </p:sp>
-      <p:sp>
-        <p:nvSpPr>
-          <p:cNvPr id="3" name="Content Placeholder 2"/>
-          <p:cNvSpPr>
-            <a:spLocks noGrp="1"/>
-          </p:cNvSpPr>
-          <p:nvPr>
-            <p:ph idx="1"/>
-          </p:nvPr>
-        </p:nvSpPr>
-        <p:spPr>
-          <a:xfrm>
-            <a:off x="677334" y="2160589"/>
-            <a:ext cx="9774766" cy="3880773"/>
-          </a:xfrm>
-        </p:spPr>
-        <p:txBody>
-          <a:bodyPr numCol="1">
-            <a:noAutofit/>
+          <a:bodyPr>
+            <a:normAutofit fontScale="70000" lnSpcReduction="20000"/>
           </a:bodyPr>
           <a:lstStyle/>
           <a:p>
             <a:r>
-              <a:rPr lang="en-US" sz="2000">
-                <a:solidFill>
-                  <a:schemeClr val="tx1"/>
-                </a:solidFill>
+              <a:rPr lang="en-US" dirty="0"/>
+              <a:t>NeuroDOT leverages the use of several commonly used neuroimaging toolboxes. The following toolboxes must be installed and added to your Matlab path for the tutorials and associated pipelines shown below:</a:t>
+            </a:r>
+          </a:p>
+          <a:p>
+            <a:r>
+              <a:rPr lang="en-US" dirty="0"/>
+              <a:t>NIRFASTer: </a:t>
+            </a:r>
+            <a:r>
+              <a:rPr lang="en-US" dirty="0">
+                <a:hlinkClick r:id="rId3"/>
               </a:rPr>
-              <a:t>Besides this presentation, there are 4 types of documentation included in the toolbox.</a:t>
-            </a:r>
-          </a:p>
-          <a:p>
-            <a:endParaRPr lang="en-US" sz="2000">
-              <a:solidFill>
-                <a:schemeClr val="tx1"/>
-              </a:solidFill>
-            </a:endParaRPr>
+              <a:t>https://github.com/nirfaster/NIRFASTer</a:t>
+            </a:r>
+            <a:r>
+              <a:rPr lang="en-US" dirty="0"/>
+              <a:t> </a:t>
+            </a:r>
           </a:p>
           <a:p>
             <a:pPr lvl="1"/>
             <a:r>
-              <a:rPr lang="en-US" sz="1800">
-                <a:solidFill>
-                  <a:schemeClr val="tx1"/>
-                </a:solidFill>
+              <a:rPr lang="en-US" dirty="0"/>
+              <a:t>Mesh generation and light modeling</a:t>
+            </a:r>
+          </a:p>
+          <a:p>
+            <a:pPr lvl="2"/>
+            <a:r>
+              <a:rPr lang="en-US" dirty="0"/>
+              <a:t>Light Modeling tutorials</a:t>
+            </a:r>
+          </a:p>
+          <a:p>
+            <a:r>
+              <a:rPr lang="en-US" dirty="0"/>
+              <a:t>GIFTI: </a:t>
+            </a:r>
+            <a:r>
+              <a:rPr lang="en-US" dirty="0">
+                <a:hlinkClick r:id="rId4"/>
               </a:rPr>
-              <a:t>Manuals and Tutorials</a:t>
+              <a:t>https://github.com/gllmflndn/gifti</a:t>
+            </a:r>
+            <a:r>
+              <a:rPr lang="en-US" dirty="0"/>
+              <a:t> </a:t>
             </a:r>
           </a:p>
           <a:p>
             <a:pPr lvl="1"/>
-            <a:endParaRPr lang="en-US" sz="2000">
-              <a:solidFill>
-                <a:schemeClr val="tx1"/>
-              </a:solidFill>
-            </a:endParaRPr>
+            <a:r>
+              <a:rPr lang="en-US" dirty="0"/>
+              <a:t>Mesh generation and loading</a:t>
+            </a:r>
+          </a:p>
+          <a:p>
+            <a:pPr lvl="2"/>
+            <a:r>
+              <a:rPr lang="en-US" dirty="0"/>
+              <a:t>Light Modeling tutorials</a:t>
+            </a:r>
+          </a:p>
+          <a:p>
+            <a:r>
+              <a:rPr lang="en-US" dirty="0"/>
+              <a:t>SNIRF: </a:t>
+            </a:r>
+            <a:r>
+              <a:rPr lang="en-US" dirty="0">
+                <a:hlinkClick r:id="rId5"/>
+              </a:rPr>
+              <a:t>https://github.com/fNIRS/snirf</a:t>
+            </a:r>
+            <a:r>
+              <a:rPr lang="en-US" dirty="0"/>
+              <a:t> </a:t>
+            </a:r>
           </a:p>
           <a:p>
             <a:pPr lvl="1"/>
             <a:r>
-              <a:rPr lang="en-US" sz="1800">
-                <a:solidFill>
-                  <a:schemeClr val="tx1"/>
-                </a:solidFill>
+              <a:rPr lang="en-US" dirty="0"/>
+              <a:t>Necessary for loading data In the SNIRF format</a:t>
+            </a:r>
+          </a:p>
+          <a:p>
+            <a:pPr lvl="2"/>
+            <a:r>
+              <a:rPr lang="en-US" dirty="0"/>
+              <a:t>Tutorial_for_Loading_Raw_Data</a:t>
+            </a:r>
+          </a:p>
+          <a:p>
+            <a:r>
+              <a:rPr lang="en-US" dirty="0"/>
+              <a:t>MCX &amp; MMC: </a:t>
+            </a:r>
+            <a:r>
+              <a:rPr lang="en-US" dirty="0">
+                <a:solidFill>
+                  <a:schemeClr val="accent1"/>
+                </a:solidFill>
+                <a:hlinkClick r:id="rId6">
+                  <a:extLst>
+                    <a:ext uri="{A12FA001-AC4F-418D-AE19-62706E023703}">
+                      <ahyp:hlinkClr xmlns:ahyp="http://schemas.microsoft.com/office/drawing/2018/hyperlinkcolor" val="tx"/>
+                    </a:ext>
+                  </a:extLst>
+                </a:hlinkClick>
               </a:rPr>
-              <a:t>Appendices</a:t>
+              <a:t>https://mcx.space/wiki/index.cgi?Get</a:t>
+            </a:r>
+            <a:r>
+              <a:rPr lang="en-US" dirty="0">
+                <a:solidFill>
+                  <a:schemeClr val="accent1"/>
+                </a:solidFill>
+              </a:rPr>
+              <a:t> </a:t>
             </a:r>
           </a:p>
           <a:p>
             <a:pPr lvl="1"/>
-            <a:endParaRPr lang="en-US" sz="1800">
-              <a:solidFill>
-                <a:schemeClr val="tx1"/>
-              </a:solidFill>
-            </a:endParaRPr>
+            <a:r>
+              <a:rPr lang="en-US" dirty="0"/>
+              <a:t>Monte Carlo simulation </a:t>
+            </a:r>
+          </a:p>
+          <a:p>
+            <a:r>
+              <a:rPr lang="en-US" dirty="0"/>
+              <a:t>FreeSurfer: </a:t>
+            </a:r>
+            <a:r>
+              <a:rPr lang="en-US" dirty="0">
+                <a:hlinkClick r:id="rId7"/>
+              </a:rPr>
+              <a:t>https://surfer.nmr.mgh.harvard.edu/fswiki/rel7downloads</a:t>
+            </a:r>
+            <a:r>
+              <a:rPr lang="en-US" dirty="0"/>
+              <a:t>  </a:t>
+            </a:r>
           </a:p>
           <a:p>
             <a:pPr lvl="1"/>
             <a:r>
-              <a:rPr lang="en-US" sz="1800">
-                <a:solidFill>
-                  <a:schemeClr val="tx1"/>
-                </a:solidFill>
+              <a:rPr lang="en-US" dirty="0"/>
+              <a:t>Pipeline and tutorial for participant-specific head modeling (coming soon!)</a:t>
+            </a:r>
+          </a:p>
+          <a:p>
+            <a:r>
+              <a:rPr lang="en-US" dirty="0"/>
+              <a:t>Connectome Workbench: </a:t>
+            </a:r>
+            <a:r>
+              <a:rPr lang="en-US" dirty="0">
+                <a:hlinkClick r:id="rId8"/>
               </a:rPr>
-              <a:t>Sample Results </a:t>
+              <a:t>https://humanconnectome.org/software/get-connectome-workbench</a:t>
+            </a:r>
+            <a:r>
+              <a:rPr lang="en-US" dirty="0"/>
+              <a:t> </a:t>
             </a:r>
           </a:p>
           <a:p>
             <a:pPr lvl="1"/>
-            <a:endParaRPr lang="en-US" sz="1800">
-              <a:solidFill>
-                <a:schemeClr val="tx1"/>
-              </a:solidFill>
-            </a:endParaRPr>
+            <a:r>
+              <a:rPr lang="en-US" dirty="0"/>
+              <a:t>Pipeline and tutorial for participant-specific head modeling (coming soon!)</a:t>
+            </a:r>
           </a:p>
           <a:p>
             <a:pPr lvl="1"/>
-            <a:r>
-              <a:rPr lang="en-US" sz="1800">
-                <a:solidFill>
-                  <a:schemeClr val="tx1"/>
-                </a:solidFill>
-              </a:rPr>
-              <a:t>Help Files</a:t>
-            </a:r>
+            <a:endParaRPr lang="en-US" dirty="0"/>
           </a:p>
         </p:txBody>
       </p:sp>
     </p:spTree>
     <p:extLst>
       <p:ext uri="{BB962C8B-B14F-4D97-AF65-F5344CB8AC3E}">
-        <p14:creationId xmlns:p14="http://schemas.microsoft.com/office/powerpoint/2010/main" val="2511703950"/>
+        <p14:creationId xmlns:p14="http://schemas.microsoft.com/office/powerpoint/2010/main" val="2287712662"/>
       </p:ext>
     </p:extLst>
   </p:cSld>
@@ -7121,7 +7501,7 @@
           <a:p>
             <a:r>
               <a:rPr lang="en-US"/>
-              <a:t>Manuals and Tutorials</a:t>
+              <a:t>Overview of Documentation</a:t>
             </a:r>
           </a:p>
         </p:txBody>
@@ -7138,8 +7518,8 @@
         </p:nvSpPr>
         <p:spPr>
           <a:xfrm>
-            <a:off x="687063" y="960877"/>
-            <a:ext cx="10616477" cy="5157821"/>
+            <a:off x="677334" y="2160589"/>
+            <a:ext cx="9774766" cy="3880773"/>
           </a:xfrm>
         </p:spPr>
         <p:txBody>
@@ -7154,39 +7534,11 @@
                   <a:schemeClr val="tx1"/>
                 </a:solidFill>
               </a:rPr>
-              <a:t>These will introduce you to the basics of the toolbox and core concepts in DOT imaging.</a:t>
-            </a:r>
-          </a:p>
-          <a:p>
-            <a:pPr lvl="1"/>
-            <a:r>
-              <a:rPr lang="en-US" sz="1800" dirty="0" err="1">
-                <a:solidFill>
-                  <a:schemeClr val="tx1"/>
-                </a:solidFill>
-              </a:rPr>
-              <a:t>NeuroDOT</a:t>
-            </a:r>
-            <a:r>
-              <a:rPr lang="en-US" sz="1800" dirty="0">
-                <a:solidFill>
-                  <a:schemeClr val="tx1"/>
-                </a:solidFill>
-              </a:rPr>
-              <a:t> User Manual</a:t>
-            </a:r>
-          </a:p>
-          <a:p>
-            <a:pPr lvl="2"/>
-            <a:r>
-              <a:rPr lang="en-US" sz="1600" dirty="0">
-                <a:solidFill>
-                  <a:schemeClr val="tx1"/>
-                </a:solidFill>
-              </a:rPr>
-              <a:t>Introduces the user to the toolbox and contains an exhaustive, centralized reference to all components.</a:t>
-            </a:r>
-            <a:endParaRPr lang="en-US" dirty="0">
+              <a:t>Besides this presentation, there are 4 types of documentation included in the toolbox.</a:t>
+            </a:r>
+          </a:p>
+          <a:p>
+            <a:endParaRPr lang="en-US" sz="2000" dirty="0">
               <a:solidFill>
                 <a:schemeClr val="tx1"/>
               </a:solidFill>
@@ -7195,102 +7547,69 @@
           <a:p>
             <a:pPr lvl="1"/>
             <a:r>
-              <a:rPr lang="en-US" sz="1800" dirty="0" err="1">
+              <a:rPr lang="en-US" sz="1800" dirty="0">
                 <a:solidFill>
                   <a:schemeClr val="tx1"/>
                 </a:solidFill>
               </a:rPr>
-              <a:t>NeuroDOT</a:t>
-            </a:r>
+              <a:t>Manuals and Tutorials</a:t>
+            </a:r>
+          </a:p>
+          <a:p>
+            <a:pPr lvl="1"/>
+            <a:endParaRPr lang="en-US" sz="2000" dirty="0">
+              <a:solidFill>
+                <a:schemeClr val="tx1"/>
+              </a:solidFill>
+            </a:endParaRPr>
+          </a:p>
+          <a:p>
+            <a:pPr lvl="1"/>
             <a:r>
               <a:rPr lang="en-US" sz="1800" dirty="0">
                 <a:solidFill>
                   <a:schemeClr val="tx1"/>
                 </a:solidFill>
               </a:rPr>
-              <a:t> Tutorial - Overview</a:t>
-            </a:r>
-          </a:p>
-          <a:p>
-            <a:pPr lvl="2"/>
-            <a:r>
-              <a:rPr lang="en-US" sz="1600" dirty="0">
+              <a:t>Appendices</a:t>
+            </a:r>
+          </a:p>
+          <a:p>
+            <a:pPr lvl="1"/>
+            <a:endParaRPr lang="en-US" sz="1800" dirty="0">
+              <a:solidFill>
+                <a:schemeClr val="tx1"/>
+              </a:solidFill>
+            </a:endParaRPr>
+          </a:p>
+          <a:p>
+            <a:pPr lvl="1"/>
+            <a:r>
+              <a:rPr lang="en-US" sz="1800" dirty="0">
                 <a:solidFill>
                   <a:schemeClr val="tx1"/>
                 </a:solidFill>
               </a:rPr>
-              <a:t>Details all components of the toolbox and explains their relationships within the experimental paradigm.</a:t>
+              <a:t>Sample Results </a:t>
             </a:r>
           </a:p>
           <a:p>
             <a:pPr lvl="1"/>
-            <a:r>
-              <a:rPr lang="en-US" sz="1800" dirty="0" err="1">
+            <a:endParaRPr lang="en-US" sz="1800" dirty="0">
+              <a:solidFill>
+                <a:schemeClr val="tx1"/>
+              </a:solidFill>
+            </a:endParaRPr>
+          </a:p>
+          <a:p>
+            <a:pPr lvl="1"/>
+            <a:r>
+              <a:rPr lang="en-US" sz="1800" dirty="0">
                 <a:solidFill>
                   <a:schemeClr val="tx1"/>
                 </a:solidFill>
               </a:rPr>
-              <a:t>NeuroDOT</a:t>
-            </a:r>
-            <a:r>
-              <a:rPr lang="en-US" sz="1800" dirty="0">
-                <a:solidFill>
-                  <a:schemeClr val="tx1"/>
-                </a:solidFill>
-              </a:rPr>
-              <a:t> Tutorial - DOT Processing Pipeline</a:t>
-            </a:r>
-          </a:p>
-          <a:p>
-            <a:pPr lvl="2"/>
-            <a:r>
-              <a:rPr lang="en-US" sz="1600" dirty="0">
-                <a:solidFill>
-                  <a:schemeClr val="tx1"/>
-                </a:solidFill>
-              </a:rPr>
-              <a:t>Takes the user step-by-step through the entire DOT processing pipeline.</a:t>
-            </a:r>
-          </a:p>
-          <a:p>
-            <a:pPr lvl="1"/>
-            <a:r>
-              <a:rPr lang="en-US" sz="1800" dirty="0" err="1">
-                <a:solidFill>
-                  <a:schemeClr val="tx1"/>
-                </a:solidFill>
-              </a:rPr>
-              <a:t>NeuroDOT</a:t>
-            </a:r>
-            <a:r>
-              <a:rPr lang="en-US" sz="1800" dirty="0">
-                <a:solidFill>
-                  <a:schemeClr val="tx1"/>
-                </a:solidFill>
-              </a:rPr>
-              <a:t> Tutorials for generating a light model</a:t>
-            </a:r>
-          </a:p>
-          <a:p>
-            <a:pPr lvl="2"/>
-            <a:r>
-              <a:rPr lang="en-US" sz="1600" dirty="0">
-                <a:solidFill>
-                  <a:schemeClr val="tx1"/>
-                </a:solidFill>
-              </a:rPr>
-              <a:t>These tutorials walk the user step-by-step through the processes required to create a light model.</a:t>
-            </a:r>
-          </a:p>
-          <a:p>
-            <a:pPr lvl="2"/>
-            <a:r>
-              <a:rPr lang="en-US" sz="1600" dirty="0">
-                <a:solidFill>
-                  <a:schemeClr val="tx1"/>
-                </a:solidFill>
-              </a:rPr>
-              <a:t>Successful completion of these will unlock the ability to fully process the Sample Data distributed with the toolbox.</a:t>
+              <a:t>Help Files</a:t>
             </a:r>
           </a:p>
         </p:txBody>
@@ -7298,7 +7617,7 @@
     </p:spTree>
     <p:extLst>
       <p:ext uri="{BB962C8B-B14F-4D97-AF65-F5344CB8AC3E}">
-        <p14:creationId xmlns:p14="http://schemas.microsoft.com/office/powerpoint/2010/main" val="623483879"/>
+        <p14:creationId xmlns:p14="http://schemas.microsoft.com/office/powerpoint/2010/main" val="2511703950"/>
       </p:ext>
     </p:extLst>
   </p:cSld>
@@ -7347,7 +7666,7 @@
           <a:p>
             <a:r>
               <a:rPr lang="en-US"/>
-              <a:t>Appendices</a:t>
+              <a:t>Manuals and Tutorials</a:t>
             </a:r>
           </a:p>
         </p:txBody>
@@ -7364,8 +7683,8 @@
         </p:nvSpPr>
         <p:spPr>
           <a:xfrm>
-            <a:off x="842705" y="1518564"/>
-            <a:ext cx="8596668" cy="5076789"/>
+            <a:off x="687063" y="960877"/>
+            <a:ext cx="10616477" cy="5157821"/>
           </a:xfrm>
         </p:spPr>
         <p:txBody>
@@ -7380,18 +7699,26 @@
                   <a:schemeClr val="tx1"/>
                 </a:solidFill>
               </a:rPr>
-              <a:t>Appendices - These explore specific topics and features of the toolbox in deeper detail.</a:t>
+              <a:t>These will introduce you to the basics of the toolbox and core concepts in DOT imaging.</a:t>
             </a:r>
           </a:p>
           <a:p>
             <a:pPr lvl="1"/>
             <a:r>
+              <a:rPr lang="en-US" sz="1800" dirty="0" err="1">
+                <a:solidFill>
+                  <a:schemeClr val="tx1"/>
+                </a:solidFill>
+              </a:rPr>
+              <a:t>NeuroDOT</a:t>
+            </a:r>
+            <a:r>
               <a:rPr lang="en-US" sz="1800" dirty="0">
                 <a:solidFill>
                   <a:schemeClr val="tx1"/>
                 </a:solidFill>
               </a:rPr>
-              <a:t>NeuroDOT Appendix - Atlases</a:t>
+              <a:t> User Manual</a:t>
             </a:r>
           </a:p>
           <a:p>
@@ -7402,18 +7729,31 @@
                   <a:schemeClr val="tx1"/>
                 </a:solidFill>
               </a:rPr>
-              <a:t>Introduces the user to atlases and other spatial concepts important to DOT.</a:t>
-            </a:r>
+              <a:t>Introduces the user to the toolbox and contains an exhaustive, centralized reference to all components.</a:t>
+            </a:r>
+            <a:endParaRPr lang="en-US" dirty="0">
+              <a:solidFill>
+                <a:schemeClr val="tx1"/>
+              </a:solidFill>
+            </a:endParaRPr>
           </a:p>
           <a:p>
             <a:pPr lvl="1"/>
             <a:r>
+              <a:rPr lang="en-US" sz="1800" dirty="0" err="1">
+                <a:solidFill>
+                  <a:schemeClr val="tx1"/>
+                </a:solidFill>
+              </a:rPr>
+              <a:t>NeuroDOT</a:t>
+            </a:r>
+            <a:r>
               <a:rPr lang="en-US" sz="1800" dirty="0">
                 <a:solidFill>
                   <a:schemeClr val="tx1"/>
                 </a:solidFill>
               </a:rPr>
-              <a:t>NeuroDOT Appendix - File IO</a:t>
+              <a:t> Tutorial - Overview</a:t>
             </a:r>
           </a:p>
           <a:p>
@@ -7424,34 +7764,56 @@
                   <a:schemeClr val="tx1"/>
                 </a:solidFill>
               </a:rPr>
-              <a:t>Reviews the file </a:t>
-            </a:r>
-            <a:r>
-              <a:rPr lang="en-US" sz="1600" dirty="0" err="1">
+              <a:t>Details all components of the toolbox and explains their relationships within the experimental paradigm.</a:t>
+            </a:r>
+          </a:p>
+          <a:p>
+            <a:pPr lvl="1"/>
+            <a:r>
+              <a:rPr lang="en-US" sz="1800" dirty="0" err="1">
                 <a:solidFill>
                   <a:schemeClr val="tx1"/>
                 </a:solidFill>
               </a:rPr>
-              <a:t>compatilibity</a:t>
-            </a:r>
+              <a:t>NeuroDOT</a:t>
+            </a:r>
+            <a:r>
+              <a:rPr lang="en-US" sz="1800" dirty="0">
+                <a:solidFill>
+                  <a:schemeClr val="tx1"/>
+                </a:solidFill>
+              </a:rPr>
+              <a:t> Tutorial - DOT Processing Pipeline</a:t>
+            </a:r>
+          </a:p>
+          <a:p>
+            <a:pPr lvl="2"/>
             <a:r>
               <a:rPr lang="en-US" sz="1600" dirty="0">
                 <a:solidFill>
                   <a:schemeClr val="tx1"/>
                 </a:solidFill>
               </a:rPr>
-              <a:t> and saving/loading capabilities of the toolbox.</a:t>
+              <a:t>Takes the user step-by-step through the entire DOT processing pipeline.</a:t>
             </a:r>
           </a:p>
           <a:p>
             <a:pPr lvl="1"/>
             <a:r>
+              <a:rPr lang="en-US" sz="1800" dirty="0" err="1">
+                <a:solidFill>
+                  <a:schemeClr val="tx1"/>
+                </a:solidFill>
+              </a:rPr>
+              <a:t>NeuroDOT</a:t>
+            </a:r>
+            <a:r>
               <a:rPr lang="en-US" sz="1800" dirty="0">
                 <a:solidFill>
                   <a:schemeClr val="tx1"/>
                 </a:solidFill>
               </a:rPr>
-              <a:t>NeuroDOT Appendix - Pipeline Diagrams</a:t>
+              <a:t> Tutorials for generating a light model</a:t>
             </a:r>
           </a:p>
           <a:p>
@@ -7462,29 +7824,18 @@
                   <a:schemeClr val="tx1"/>
                 </a:solidFill>
               </a:rPr>
-              <a:t>Provides comprehensive diagrams of all pipelines and functionalities contained in the toolbox.</a:t>
-            </a:r>
-          </a:p>
-          <a:p>
-            <a:pPr lvl="1"/>
-            <a:r>
-              <a:rPr lang="en-US" sz="1800" dirty="0">
+              <a:t>These tutorials walk the user step-by-step through the processes required to create a light model.</a:t>
+            </a:r>
+          </a:p>
+          <a:p>
+            <a:pPr lvl="2"/>
+            <a:r>
+              <a:rPr lang="en-US" sz="1600" dirty="0">
                 <a:solidFill>
                   <a:schemeClr val="tx1"/>
                 </a:solidFill>
               </a:rPr>
-              <a:t>NeuroDOT Appendix - Preprocessing Pipeline Analysis</a:t>
-            </a:r>
-          </a:p>
-          <a:p>
-            <a:pPr lvl="2"/>
-            <a:r>
-              <a:rPr lang="en-US" sz="1600" dirty="0">
-                <a:solidFill>
-                  <a:schemeClr val="tx1"/>
-                </a:solidFill>
-              </a:rPr>
-              <a:t>Gives an analysis of how the preprocessing pipeline works.</a:t>
+              <a:t>Successful completion of these will unlock the ability to fully process the Sample Data distributed with the toolbox.</a:t>
             </a:r>
           </a:p>
         </p:txBody>
@@ -7492,7 +7843,7 @@
     </p:spTree>
     <p:extLst>
       <p:ext uri="{BB962C8B-B14F-4D97-AF65-F5344CB8AC3E}">
-        <p14:creationId xmlns:p14="http://schemas.microsoft.com/office/powerpoint/2010/main" val="2531514356"/>
+        <p14:creationId xmlns:p14="http://schemas.microsoft.com/office/powerpoint/2010/main" val="623483879"/>
       </p:ext>
     </p:extLst>
   </p:cSld>
@@ -7541,7 +7892,7 @@
           <a:p>
             <a:r>
               <a:rPr lang="en-US"/>
-              <a:t>Sample Results Appendices</a:t>
+              <a:t>Appendices</a:t>
             </a:r>
           </a:p>
         </p:txBody>
@@ -7558,8 +7909,8 @@
         </p:nvSpPr>
         <p:spPr>
           <a:xfrm>
-            <a:off x="677334" y="2160589"/>
-            <a:ext cx="10285738" cy="3880773"/>
+            <a:off x="842705" y="1518564"/>
+            <a:ext cx="8596668" cy="5076789"/>
           </a:xfrm>
         </p:spPr>
         <p:txBody>
@@ -7574,7 +7925,7 @@
                   <a:schemeClr val="tx1"/>
                 </a:solidFill>
               </a:rPr>
-              <a:t>Sample Results Appendices - These provide visualizations for new users who have completed the Processing Pipeline tutorial to be able to compare their own results on the other samples provided with the toolbox.</a:t>
+              <a:t>Appendices - These explore specific topics and features of the toolbox in deeper detail.</a:t>
             </a:r>
           </a:p>
           <a:p>
@@ -7585,51 +7936,34 @@
                   <a:schemeClr val="tx1"/>
                 </a:solidFill>
               </a:rPr>
-              <a:t>NeuroDOT Appendix - CCW Sample Results</a:t>
-            </a:r>
-          </a:p>
-          <a:p>
-            <a:pPr lvl="1"/>
-            <a:r>
-              <a:rPr lang="en-US" sz="1800" dirty="0">
+              <a:t>NeuroDOT Appendix - File IO</a:t>
+            </a:r>
+          </a:p>
+          <a:p>
+            <a:pPr lvl="2"/>
+            <a:r>
+              <a:rPr lang="en-US" sz="1600" dirty="0">
                 <a:solidFill>
                   <a:schemeClr val="tx1"/>
                 </a:solidFill>
               </a:rPr>
-              <a:t>NeuroDOT Appendix - CW Sample Results</a:t>
-            </a:r>
-          </a:p>
-          <a:p>
-            <a:pPr lvl="1"/>
-            <a:r>
-              <a:rPr lang="en-US" sz="1800" dirty="0">
+              <a:t>Reviews the file </a:t>
+            </a:r>
+            <a:r>
+              <a:rPr lang="en-US" sz="1600" dirty="0" err="1">
                 <a:solidFill>
                   <a:schemeClr val="tx1"/>
                 </a:solidFill>
               </a:rPr>
-              <a:t>NeuroDOT Appendix - HW Sample Results</a:t>
-            </a:r>
-          </a:p>
-          <a:p>
-            <a:pPr lvl="1"/>
-            <a:r>
-              <a:rPr lang="en-US" sz="1800" dirty="0">
+              <a:t>compatilibity</a:t>
+            </a:r>
+            <a:r>
+              <a:rPr lang="en-US" sz="1600" dirty="0">
                 <a:solidFill>
                   <a:schemeClr val="tx1"/>
                 </a:solidFill>
               </a:rPr>
-              <a:t>NeuroDOT Appendix - HW Sample Noisy Results</a:t>
-            </a:r>
-          </a:p>
-          <a:p>
-            <a:pPr lvl="1"/>
-            <a:r>
-              <a:rPr lang="en-US" sz="1800" dirty="0">
-                <a:solidFill>
-                  <a:schemeClr val="tx1"/>
-                </a:solidFill>
-              </a:rPr>
-              <a:t>NeuroDOT Appendix - GV Sample Results</a:t>
+              <a:t> and saving/loading capabilities of the toolbox.</a:t>
             </a:r>
           </a:p>
         </p:txBody>
@@ -7637,7 +7971,7 @@
     </p:spTree>
     <p:extLst>
       <p:ext uri="{BB962C8B-B14F-4D97-AF65-F5344CB8AC3E}">
-        <p14:creationId xmlns:p14="http://schemas.microsoft.com/office/powerpoint/2010/main" val="3312847216"/>
+        <p14:creationId xmlns:p14="http://schemas.microsoft.com/office/powerpoint/2010/main" val="2531514356"/>
       </p:ext>
     </p:extLst>
   </p:cSld>
@@ -7686,7 +8020,7 @@
           <a:p>
             <a:r>
               <a:rPr lang="en-US"/>
-              <a:t>Help Files</a:t>
+              <a:t>Sample Results Appendices</a:t>
             </a:r>
           </a:p>
         </p:txBody>
@@ -7703,8 +8037,8 @@
         </p:nvSpPr>
         <p:spPr>
           <a:xfrm>
-            <a:off x="910798" y="1320800"/>
-            <a:ext cx="8596668" cy="5070272"/>
+            <a:off x="677334" y="2160589"/>
+            <a:ext cx="10285738" cy="3880773"/>
           </a:xfrm>
         </p:spPr>
         <p:txBody>
@@ -7719,7 +8053,7 @@
                   <a:schemeClr val="tx1"/>
                 </a:solidFill>
               </a:rPr>
-              <a:t>Help Files - These provide function-specific information similar to and viewable through MATLAB's own help documentation.</a:t>
+              <a:t>Sample Results Appendices - These provide visualizations for new users who have completed the Processing Pipeline tutorial to be able to compare their own results on the other samples provided with the toolbox.</a:t>
             </a:r>
           </a:p>
           <a:p>
@@ -7730,124 +8064,18 @@
                   <a:schemeClr val="tx1"/>
                 </a:solidFill>
               </a:rPr>
-              <a:t>Function Help Sections</a:t>
-            </a:r>
-          </a:p>
-          <a:p>
-            <a:pPr lvl="2"/>
-            <a:r>
-              <a:rPr lang="en-US" sz="1600" dirty="0">
+              <a:t>NeuroDOT Appendix - CCW Sample Results</a:t>
+            </a:r>
+          </a:p>
+          <a:p>
+            <a:pPr lvl="1"/>
+            <a:r>
+              <a:rPr lang="en-US" sz="1800" dirty="0">
                 <a:solidFill>
                   <a:schemeClr val="tx1"/>
                 </a:solidFill>
               </a:rPr>
-              <a:t>These are contained in each function, and can be called from the command line with </a:t>
-            </a:r>
-            <a:r>
-              <a:rPr lang="en-US" sz="1600" dirty="0">
-                <a:solidFill>
-                  <a:srgbClr val="00B0F0"/>
-                </a:solidFill>
-              </a:rPr>
-              <a:t>help </a:t>
-            </a:r>
-            <a:r>
-              <a:rPr lang="en-US" sz="1600" i="1" dirty="0" err="1">
-                <a:solidFill>
-                  <a:srgbClr val="00B0F0"/>
-                </a:solidFill>
-              </a:rPr>
-              <a:t>function_name</a:t>
-            </a:r>
-            <a:r>
-              <a:rPr lang="en-US" sz="1600" dirty="0">
-                <a:solidFill>
-                  <a:schemeClr val="tx1"/>
-                </a:solidFill>
-              </a:rPr>
-              <a:t>.</a:t>
-            </a:r>
-          </a:p>
-          <a:p>
-            <a:pPr lvl="1"/>
-            <a:r>
-              <a:rPr lang="en-US" sz="1800" dirty="0">
-                <a:solidFill>
-                  <a:schemeClr val="tx1"/>
-                </a:solidFill>
-              </a:rPr>
-              <a:t>Toolbox Help (through MATLAB Help Viewer)</a:t>
-            </a:r>
-          </a:p>
-          <a:p>
-            <a:pPr lvl="2"/>
-            <a:r>
-              <a:rPr lang="en-US" sz="1600" dirty="0">
-                <a:solidFill>
-                  <a:schemeClr val="tx1"/>
-                </a:solidFill>
-              </a:rPr>
-              <a:t>This is a plug-in to the MATLAB Help Viewer that becomes accessible as soon as the </a:t>
-            </a:r>
-            <a:r>
-              <a:rPr lang="en-US" sz="1600" dirty="0" err="1">
-                <a:solidFill>
-                  <a:schemeClr val="tx1"/>
-                </a:solidFill>
-              </a:rPr>
-              <a:t>NeuroDOT</a:t>
-            </a:r>
-            <a:r>
-              <a:rPr lang="en-US" sz="1600" dirty="0">
-                <a:solidFill>
-                  <a:schemeClr val="tx1"/>
-                </a:solidFill>
-              </a:rPr>
-              <a:t> 2 directory is added to the MATLAB search path.</a:t>
-            </a:r>
-          </a:p>
-          <a:p>
-            <a:pPr lvl="1"/>
-            <a:r>
-              <a:rPr lang="en-US" sz="1800" dirty="0">
-                <a:solidFill>
-                  <a:schemeClr val="tx1"/>
-                </a:solidFill>
-              </a:rPr>
-              <a:t>User Manual Index</a:t>
-            </a:r>
-          </a:p>
-          <a:p>
-            <a:pPr lvl="2"/>
-            <a:r>
-              <a:rPr lang="en-US" sz="1600" dirty="0">
-                <a:solidFill>
-                  <a:schemeClr val="tx1"/>
-                </a:solidFill>
-              </a:rPr>
-              <a:t>A hyperlinked index of all components of the toolbox.</a:t>
-            </a:r>
-          </a:p>
-          <a:p>
-            <a:pPr lvl="1"/>
-            <a:r>
-              <a:rPr lang="en-US" sz="1800" dirty="0">
-                <a:solidFill>
-                  <a:schemeClr val="tx1"/>
-                </a:solidFill>
-              </a:rPr>
-              <a:t>Pipeline Scripts</a:t>
-            </a:r>
-          </a:p>
-          <a:p>
-            <a:pPr lvl="2"/>
-            <a:r>
-              <a:rPr lang="en-US" sz="1600" dirty="0">
-                <a:solidFill>
-                  <a:schemeClr val="tx1"/>
-                </a:solidFill>
-              </a:rPr>
-              <a:t>Pre-assembled scripts for each pipeline.</a:t>
+              <a:t>NeuroDOT Appendix - CW Sample Results</a:t>
             </a:r>
           </a:p>
         </p:txBody>
@@ -7855,7 +8083,7 @@
     </p:spTree>
     <p:extLst>
       <p:ext uri="{BB962C8B-B14F-4D97-AF65-F5344CB8AC3E}">
-        <p14:creationId xmlns:p14="http://schemas.microsoft.com/office/powerpoint/2010/main" val="2279508605"/>
+        <p14:creationId xmlns:p14="http://schemas.microsoft.com/office/powerpoint/2010/main" val="3312847216"/>
       </p:ext>
     </p:extLst>
   </p:cSld>

</xml_diff>